<commit_message>
[UPDATE] PL session 8 slides
</commit_message>
<xml_diff>
--- a/materials/session8/PL/ML-Session8-PL.pptx
+++ b/materials/session8/PL/ML-Session8-PL.pptx
@@ -11,6 +11,7 @@
     <p:sldId id="295" r:id="rId5"/>
     <p:sldId id="296" r:id="rId6"/>
     <p:sldId id="297" r:id="rId7"/>
+    <p:sldId id="298" r:id="rId8"/>
   </p:sldIdLst>
   <p:sldSz cx="12192000" cy="6858000"/>
   <p:notesSz cx="6858000" cy="9144000"/>
@@ -122,6 +123,7 @@
   <p1510:revLst>
     <p1510:client id="{3A26A2EA-0772-4FF1-A9B5-AD8EBCE6B292}" v="163" dt="2024-03-04T17:20:05.854"/>
     <p1510:client id="{A0540DC6-5085-47F0-E14B-77C033EE3F24}" v="41" dt="2024-03-04T21:27:35.796"/>
+    <p1510:client id="{D6BC8481-3A28-AB60-F49B-750862D85781}" v="6" dt="2024-03-05T08:52:15.161"/>
   </p1510:revLst>
 </p1510:revInfo>
 </file>
@@ -255,7 +257,7 @@
           <a:p>
             <a:fld id="{E431C0BB-DC71-4713-A787-95011EDB8CA8}" type="datetimeFigureOut">
               <a:rPr lang="pt-PT" smtClean="0"/>
-              <a:t>04/03/2024</a:t>
+              <a:t>05/03/2024</a:t>
             </a:fld>
             <a:endParaRPr lang="pt-PT"/>
           </a:p>
@@ -423,7 +425,7 @@
           <a:p>
             <a:fld id="{E431C0BB-DC71-4713-A787-95011EDB8CA8}" type="datetimeFigureOut">
               <a:rPr lang="pt-PT" smtClean="0"/>
-              <a:t>04/03/2024</a:t>
+              <a:t>05/03/2024</a:t>
             </a:fld>
             <a:endParaRPr lang="pt-PT"/>
           </a:p>
@@ -601,7 +603,7 @@
           <a:p>
             <a:fld id="{E431C0BB-DC71-4713-A787-95011EDB8CA8}" type="datetimeFigureOut">
               <a:rPr lang="pt-PT" smtClean="0"/>
-              <a:t>04/03/2024</a:t>
+              <a:t>05/03/2024</a:t>
             </a:fld>
             <a:endParaRPr lang="pt-PT"/>
           </a:p>
@@ -769,7 +771,7 @@
           <a:p>
             <a:fld id="{E431C0BB-DC71-4713-A787-95011EDB8CA8}" type="datetimeFigureOut">
               <a:rPr lang="pt-PT" smtClean="0"/>
-              <a:t>04/03/2024</a:t>
+              <a:t>05/03/2024</a:t>
             </a:fld>
             <a:endParaRPr lang="pt-PT"/>
           </a:p>
@@ -1014,7 +1016,7 @@
           <a:p>
             <a:fld id="{E431C0BB-DC71-4713-A787-95011EDB8CA8}" type="datetimeFigureOut">
               <a:rPr lang="pt-PT" smtClean="0"/>
-              <a:t>04/03/2024</a:t>
+              <a:t>05/03/2024</a:t>
             </a:fld>
             <a:endParaRPr lang="pt-PT"/>
           </a:p>
@@ -1243,7 +1245,7 @@
           <a:p>
             <a:fld id="{E431C0BB-DC71-4713-A787-95011EDB8CA8}" type="datetimeFigureOut">
               <a:rPr lang="pt-PT" smtClean="0"/>
-              <a:t>04/03/2024</a:t>
+              <a:t>05/03/2024</a:t>
             </a:fld>
             <a:endParaRPr lang="pt-PT"/>
           </a:p>
@@ -1607,7 +1609,7 @@
           <a:p>
             <a:fld id="{E431C0BB-DC71-4713-A787-95011EDB8CA8}" type="datetimeFigureOut">
               <a:rPr lang="pt-PT" smtClean="0"/>
-              <a:t>04/03/2024</a:t>
+              <a:t>05/03/2024</a:t>
             </a:fld>
             <a:endParaRPr lang="pt-PT"/>
           </a:p>
@@ -1724,7 +1726,7 @@
           <a:p>
             <a:fld id="{E431C0BB-DC71-4713-A787-95011EDB8CA8}" type="datetimeFigureOut">
               <a:rPr lang="pt-PT" smtClean="0"/>
-              <a:t>04/03/2024</a:t>
+              <a:t>05/03/2024</a:t>
             </a:fld>
             <a:endParaRPr lang="pt-PT"/>
           </a:p>
@@ -1819,7 +1821,7 @@
           <a:p>
             <a:fld id="{E431C0BB-DC71-4713-A787-95011EDB8CA8}" type="datetimeFigureOut">
               <a:rPr lang="pt-PT" smtClean="0"/>
-              <a:t>04/03/2024</a:t>
+              <a:t>05/03/2024</a:t>
             </a:fld>
             <a:endParaRPr lang="pt-PT"/>
           </a:p>
@@ -2094,7 +2096,7 @@
           <a:p>
             <a:fld id="{E431C0BB-DC71-4713-A787-95011EDB8CA8}" type="datetimeFigureOut">
               <a:rPr lang="pt-PT" smtClean="0"/>
-              <a:t>04/03/2024</a:t>
+              <a:t>05/03/2024</a:t>
             </a:fld>
             <a:endParaRPr lang="pt-PT"/>
           </a:p>
@@ -2346,7 +2348,7 @@
           <a:p>
             <a:fld id="{E431C0BB-DC71-4713-A787-95011EDB8CA8}" type="datetimeFigureOut">
               <a:rPr lang="pt-PT" smtClean="0"/>
-              <a:t>04/03/2024</a:t>
+              <a:t>05/03/2024</a:t>
             </a:fld>
             <a:endParaRPr lang="pt-PT"/>
           </a:p>
@@ -2557,7 +2559,7 @@
           <a:p>
             <a:fld id="{E431C0BB-DC71-4713-A787-95011EDB8CA8}" type="datetimeFigureOut">
               <a:rPr lang="pt-PT" smtClean="0"/>
-              <a:t>04/03/2024</a:t>
+              <a:t>05/03/2024</a:t>
             </a:fld>
             <a:endParaRPr lang="pt-PT"/>
           </a:p>
@@ -6797,6 +6799,687 @@
 </p:sld>
 </file>
 
+<file path=ppt/slides/slide7.xml><?xml version="1.0" encoding="utf-8"?>
+<p:sld xmlns:a="http://schemas.openxmlformats.org/drawingml/2006/main" xmlns:r="http://schemas.openxmlformats.org/officeDocument/2006/relationships" xmlns:p="http://schemas.openxmlformats.org/presentationml/2006/main">
+  <p:cSld>
+    <p:spTree>
+      <p:nvGrpSpPr>
+        <p:cNvPr id="1" name=""/>
+        <p:cNvGrpSpPr/>
+        <p:nvPr/>
+      </p:nvGrpSpPr>
+      <p:grpSpPr>
+        <a:xfrm>
+          <a:off x="0" y="0"/>
+          <a:ext cx="0" cy="0"/>
+          <a:chOff x="0" y="0"/>
+          <a:chExt cx="0" cy="0"/>
+        </a:xfrm>
+      </p:grpSpPr>
+      <p:sp>
+        <p:nvSpPr>
+          <p:cNvPr id="2" name="Título 1">
+            <a:extLst>
+              <a:ext uri="{FF2B5EF4-FFF2-40B4-BE49-F238E27FC236}">
+                <a16:creationId xmlns:a16="http://schemas.microsoft.com/office/drawing/2014/main" id="{4D56E20A-6DB5-4A6B-9EEB-FA9732C72527}"/>
+              </a:ext>
+            </a:extLst>
+          </p:cNvPr>
+          <p:cNvSpPr>
+            <a:spLocks noGrp="1"/>
+          </p:cNvSpPr>
+          <p:nvPr>
+            <p:ph type="title"/>
+          </p:nvPr>
+        </p:nvSpPr>
+        <p:spPr>
+          <a:xfrm>
+            <a:off x="170048" y="-177"/>
+            <a:ext cx="10515600" cy="1325563"/>
+          </a:xfrm>
+        </p:spPr>
+        <p:txBody>
+          <a:bodyPr>
+            <a:normAutofit/>
+          </a:bodyPr>
+          <a:lstStyle/>
+          <a:p>
+            <a:r>
+              <a:rPr lang="pt-PT" sz="3600" b="1" dirty="0" err="1">
+                <a:solidFill>
+                  <a:srgbClr val="092953"/>
+                </a:solidFill>
+              </a:rPr>
+              <a:t>Exercises</a:t>
+            </a:r>
+            <a:r>
+              <a:rPr lang="pt-PT" sz="3600" b="1" dirty="0">
+                <a:solidFill>
+                  <a:srgbClr val="092953"/>
+                </a:solidFill>
+              </a:rPr>
+              <a:t>:</a:t>
+            </a:r>
+          </a:p>
+        </p:txBody>
+      </p:sp>
+      <p:sp>
+        <p:nvSpPr>
+          <p:cNvPr id="3" name="Marcador de Posição de Conteúdo 2">
+            <a:extLst>
+              <a:ext uri="{FF2B5EF4-FFF2-40B4-BE49-F238E27FC236}">
+                <a16:creationId xmlns:a16="http://schemas.microsoft.com/office/drawing/2014/main" id="{1B32614E-E287-1059-727D-571681FEAF1D}"/>
+              </a:ext>
+            </a:extLst>
+          </p:cNvPr>
+          <p:cNvSpPr>
+            <a:spLocks noGrp="1"/>
+          </p:cNvSpPr>
+          <p:nvPr>
+            <p:ph idx="1"/>
+          </p:nvPr>
+        </p:nvSpPr>
+        <p:spPr>
+          <a:xfrm>
+            <a:off x="838200" y="1332642"/>
+            <a:ext cx="10732153" cy="5020411"/>
+          </a:xfrm>
+        </p:spPr>
+        <p:txBody>
+          <a:bodyPr vert="horz" lIns="91440" tIns="45720" rIns="91440" bIns="45720" rtlCol="0" anchor="t">
+            <a:normAutofit/>
+          </a:bodyPr>
+          <a:lstStyle/>
+          <a:p>
+            <a:pPr algn="just"/>
+            <a:r>
+              <a:rPr lang="pt-PT" dirty="0" err="1">
+                <a:ea typeface="+mn-lt"/>
+                <a:cs typeface="+mn-lt"/>
+              </a:rPr>
+              <a:t>Notebooks</a:t>
+            </a:r>
+            <a:r>
+              <a:rPr lang="pt-PT" dirty="0">
+                <a:ea typeface="+mn-lt"/>
+                <a:cs typeface="+mn-lt"/>
+              </a:rPr>
+              <a:t> </a:t>
+            </a:r>
+            <a:r>
+              <a:rPr lang="pt-PT" dirty="0" err="1">
+                <a:ea typeface="+mn-lt"/>
+                <a:cs typeface="+mn-lt"/>
+              </a:rPr>
+              <a:t>on</a:t>
+            </a:r>
+            <a:r>
+              <a:rPr lang="pt-PT" dirty="0">
+                <a:ea typeface="+mn-lt"/>
+                <a:cs typeface="+mn-lt"/>
+              </a:rPr>
+              <a:t> </a:t>
+            </a:r>
+            <a:r>
+              <a:rPr lang="pt-PT" dirty="0" err="1">
+                <a:ea typeface="+mn-lt"/>
+                <a:cs typeface="+mn-lt"/>
+              </a:rPr>
+              <a:t>the</a:t>
+            </a:r>
+            <a:r>
+              <a:rPr lang="pt-PT" dirty="0">
+                <a:ea typeface="+mn-lt"/>
+                <a:cs typeface="+mn-lt"/>
+              </a:rPr>
+              <a:t> </a:t>
+            </a:r>
+            <a:r>
+              <a:rPr lang="pt-PT" dirty="0" err="1">
+                <a:ea typeface="+mn-lt"/>
+                <a:cs typeface="+mn-lt"/>
+              </a:rPr>
+              <a:t>github</a:t>
+            </a:r>
+            <a:r>
+              <a:rPr lang="pt-PT" dirty="0">
+                <a:ea typeface="+mn-lt"/>
+                <a:cs typeface="+mn-lt"/>
+              </a:rPr>
+              <a:t> </a:t>
+            </a:r>
+            <a:r>
+              <a:rPr lang="pt-PT" dirty="0" err="1">
+                <a:ea typeface="+mn-lt"/>
+                <a:cs typeface="+mn-lt"/>
+              </a:rPr>
+              <a:t>repository</a:t>
+            </a:r>
+            <a:r>
+              <a:rPr lang="pt-PT" dirty="0">
+                <a:ea typeface="+mn-lt"/>
+                <a:cs typeface="+mn-lt"/>
+              </a:rPr>
+              <a:t>: </a:t>
+            </a:r>
+            <a:endParaRPr lang="pt-PT" dirty="0"/>
+          </a:p>
+          <a:p>
+            <a:pPr lvl="1" algn="just">
+              <a:buFont typeface="Wingdings" panose="020B0604020202020204" pitchFamily="34" charset="0"/>
+              <a:buChar char="§"/>
+            </a:pPr>
+            <a:r>
+              <a:rPr lang="pt-PT" dirty="0">
+                <a:ea typeface="+mn-lt"/>
+                <a:cs typeface="+mn-lt"/>
+              </a:rPr>
+              <a:t>Notebook </a:t>
+            </a:r>
+            <a:r>
+              <a:rPr lang="pt-PT" dirty="0" err="1">
+                <a:ea typeface="+mn-lt"/>
+                <a:cs typeface="+mn-lt"/>
+              </a:rPr>
+              <a:t>with</a:t>
+            </a:r>
+            <a:r>
+              <a:rPr lang="pt-PT" dirty="0">
+                <a:ea typeface="+mn-lt"/>
+                <a:cs typeface="+mn-lt"/>
+              </a:rPr>
+              <a:t> </a:t>
+            </a:r>
+            <a:r>
+              <a:rPr lang="pt-PT" dirty="0" err="1">
+                <a:ea typeface="+mn-lt"/>
+                <a:cs typeface="+mn-lt"/>
+              </a:rPr>
+              <a:t>examples</a:t>
+            </a:r>
+            <a:r>
+              <a:rPr lang="pt-PT" dirty="0">
+                <a:ea typeface="+mn-lt"/>
+                <a:cs typeface="+mn-lt"/>
+              </a:rPr>
+              <a:t>: </a:t>
+            </a:r>
+            <a:endParaRPr lang="pt-PT" dirty="0"/>
+          </a:p>
+          <a:p>
+            <a:pPr lvl="2" algn="just">
+              <a:buFont typeface="Wingdings" panose="020B0604020202020204" pitchFamily="34" charset="0"/>
+              <a:buChar char="§"/>
+            </a:pPr>
+            <a:r>
+              <a:rPr lang="pt-PT" dirty="0" err="1">
+                <a:ea typeface="+mn-lt"/>
+                <a:cs typeface="+mn-lt"/>
+              </a:rPr>
+              <a:t>notebooks</a:t>
+            </a:r>
+            <a:r>
+              <a:rPr lang="pt-PT" dirty="0">
+                <a:ea typeface="+mn-lt"/>
+                <a:cs typeface="+mn-lt"/>
+              </a:rPr>
+              <a:t>/session8/</a:t>
+            </a:r>
+            <a:r>
+              <a:rPr lang="pt-PT" dirty="0" err="1">
+                <a:ea typeface="+mn-lt"/>
+                <a:cs typeface="+mn-lt"/>
+              </a:rPr>
+              <a:t>examples.ipynb</a:t>
+            </a:r>
+            <a:r>
+              <a:rPr lang="pt-PT" dirty="0">
+                <a:ea typeface="+mn-lt"/>
+                <a:cs typeface="+mn-lt"/>
+              </a:rPr>
+              <a:t> </a:t>
+            </a:r>
+            <a:endParaRPr lang="pt-PT" dirty="0"/>
+          </a:p>
+          <a:p>
+            <a:pPr lvl="1" algn="just">
+              <a:buFont typeface="Wingdings" panose="020B0604020202020204" pitchFamily="34" charset="0"/>
+              <a:buChar char="§"/>
+            </a:pPr>
+            <a:r>
+              <a:rPr lang="pt-PT" dirty="0">
+                <a:ea typeface="+mn-lt"/>
+                <a:cs typeface="+mn-lt"/>
+              </a:rPr>
+              <a:t>Notebook </a:t>
+            </a:r>
+            <a:r>
+              <a:rPr lang="pt-PT" dirty="0" err="1">
+                <a:ea typeface="+mn-lt"/>
+                <a:cs typeface="+mn-lt"/>
+              </a:rPr>
+              <a:t>with</a:t>
+            </a:r>
+            <a:r>
+              <a:rPr lang="pt-PT" dirty="0">
+                <a:ea typeface="+mn-lt"/>
+                <a:cs typeface="+mn-lt"/>
+              </a:rPr>
+              <a:t> </a:t>
+            </a:r>
+            <a:r>
+              <a:rPr lang="pt-PT" dirty="0" err="1">
+                <a:ea typeface="+mn-lt"/>
+                <a:cs typeface="+mn-lt"/>
+              </a:rPr>
+              <a:t>exercises</a:t>
+            </a:r>
+            <a:r>
+              <a:rPr lang="pt-PT" dirty="0">
+                <a:ea typeface="+mn-lt"/>
+                <a:cs typeface="+mn-lt"/>
+              </a:rPr>
+              <a:t>: </a:t>
+            </a:r>
+          </a:p>
+          <a:p>
+            <a:pPr lvl="2" algn="just">
+              <a:buFont typeface="Wingdings" panose="020B0604020202020204" pitchFamily="34" charset="0"/>
+              <a:buChar char="§"/>
+            </a:pPr>
+            <a:r>
+              <a:rPr lang="pt-PT" dirty="0" err="1">
+                <a:ea typeface="+mn-lt"/>
+                <a:cs typeface="+mn-lt"/>
+              </a:rPr>
+              <a:t>notebooks</a:t>
+            </a:r>
+            <a:r>
+              <a:rPr lang="pt-PT" dirty="0">
+                <a:ea typeface="+mn-lt"/>
+                <a:cs typeface="+mn-lt"/>
+              </a:rPr>
+              <a:t>/session8/</a:t>
+            </a:r>
+            <a:r>
+              <a:rPr lang="pt-PT" dirty="0" err="1">
+                <a:ea typeface="+mn-lt"/>
+                <a:cs typeface="+mn-lt"/>
+              </a:rPr>
+              <a:t>exercises.ipynb</a:t>
+            </a:r>
+            <a:endParaRPr lang="pt-PT" dirty="0" err="1"/>
+          </a:p>
+          <a:p>
+            <a:pPr algn="just"/>
+            <a:endParaRPr lang="pt-PT" sz="2200" dirty="0">
+              <a:ea typeface="+mn-lt"/>
+              <a:cs typeface="+mn-lt"/>
+            </a:endParaRPr>
+          </a:p>
+          <a:p>
+            <a:pPr lvl="1" algn="just">
+              <a:buFont typeface="Wingdings" panose="020B0604020202020204" pitchFamily="34" charset="0"/>
+              <a:buChar char="§"/>
+            </a:pPr>
+            <a:endParaRPr lang="pt-PT" sz="2000" dirty="0">
+              <a:ea typeface="+mn-lt"/>
+              <a:cs typeface="+mn-lt"/>
+            </a:endParaRPr>
+          </a:p>
+          <a:p>
+            <a:pPr algn="just"/>
+            <a:endParaRPr lang="pt-PT" sz="1400" dirty="0">
+              <a:ea typeface="+mn-lt"/>
+              <a:cs typeface="+mn-lt"/>
+            </a:endParaRPr>
+          </a:p>
+          <a:p>
+            <a:pPr algn="just"/>
+            <a:endParaRPr lang="pt-PT" dirty="0">
+              <a:ea typeface="+mn-lt"/>
+              <a:cs typeface="+mn-lt"/>
+            </a:endParaRPr>
+          </a:p>
+        </p:txBody>
+      </p:sp>
+      <p:sp>
+        <p:nvSpPr>
+          <p:cNvPr id="4" name="Retângulo 3">
+            <a:extLst>
+              <a:ext uri="{FF2B5EF4-FFF2-40B4-BE49-F238E27FC236}">
+                <a16:creationId xmlns:a16="http://schemas.microsoft.com/office/drawing/2014/main" id="{C49AACF5-CCF4-E6B6-98B5-BF66BBB3419C}"/>
+              </a:ext>
+            </a:extLst>
+          </p:cNvPr>
+          <p:cNvSpPr/>
+          <p:nvPr/>
+        </p:nvSpPr>
+        <p:spPr>
+          <a:xfrm>
+            <a:off x="0" y="6626645"/>
+            <a:ext cx="12192000" cy="231355"/>
+          </a:xfrm>
+          <a:prstGeom prst="rect">
+            <a:avLst/>
+          </a:prstGeom>
+          <a:solidFill>
+            <a:srgbClr val="092953"/>
+          </a:solidFill>
+          <a:ln>
+            <a:solidFill>
+              <a:srgbClr val="092953"/>
+            </a:solidFill>
+          </a:ln>
+        </p:spPr>
+        <p:style>
+          <a:lnRef idx="2">
+            <a:schemeClr val="accent1">
+              <a:shade val="15000"/>
+            </a:schemeClr>
+          </a:lnRef>
+          <a:fillRef idx="1">
+            <a:schemeClr val="accent1"/>
+          </a:fillRef>
+          <a:effectRef idx="0">
+            <a:schemeClr val="accent1"/>
+          </a:effectRef>
+          <a:fontRef idx="minor">
+            <a:schemeClr val="lt1"/>
+          </a:fontRef>
+        </p:style>
+        <p:txBody>
+          <a:bodyPr rot="0" spcFirstLastPara="0" vert="horz" wrap="square" lIns="91440" tIns="45720" rIns="91440" bIns="45720" numCol="1" spcCol="0" rtlCol="0" fromWordArt="0" anchor="ctr" anchorCtr="0" forceAA="0" compatLnSpc="1">
+            <a:prstTxWarp prst="textNoShape">
+              <a:avLst/>
+            </a:prstTxWarp>
+            <a:noAutofit/>
+          </a:bodyPr>
+          <a:lstStyle>
+            <a:defPPr>
+              <a:defRPr lang="pt-PT"/>
+            </a:defPPr>
+            <a:lvl1pPr marL="0" algn="l" defTabSz="914400" rtl="0" eaLnBrk="1" latinLnBrk="0" hangingPunct="1">
+              <a:defRPr sz="1800" kern="1200">
+                <a:solidFill>
+                  <a:schemeClr val="lt1"/>
+                </a:solidFill>
+                <a:latin typeface="+mn-lt"/>
+                <a:ea typeface="+mn-ea"/>
+                <a:cs typeface="+mn-cs"/>
+              </a:defRPr>
+            </a:lvl1pPr>
+            <a:lvl2pPr marL="457200" algn="l" defTabSz="914400" rtl="0" eaLnBrk="1" latinLnBrk="0" hangingPunct="1">
+              <a:defRPr sz="1800" kern="1200">
+                <a:solidFill>
+                  <a:schemeClr val="lt1"/>
+                </a:solidFill>
+                <a:latin typeface="+mn-lt"/>
+                <a:ea typeface="+mn-ea"/>
+                <a:cs typeface="+mn-cs"/>
+              </a:defRPr>
+            </a:lvl2pPr>
+            <a:lvl3pPr marL="914400" algn="l" defTabSz="914400" rtl="0" eaLnBrk="1" latinLnBrk="0" hangingPunct="1">
+              <a:defRPr sz="1800" kern="1200">
+                <a:solidFill>
+                  <a:schemeClr val="lt1"/>
+                </a:solidFill>
+                <a:latin typeface="+mn-lt"/>
+                <a:ea typeface="+mn-ea"/>
+                <a:cs typeface="+mn-cs"/>
+              </a:defRPr>
+            </a:lvl3pPr>
+            <a:lvl4pPr marL="1371600" algn="l" defTabSz="914400" rtl="0" eaLnBrk="1" latinLnBrk="0" hangingPunct="1">
+              <a:defRPr sz="1800" kern="1200">
+                <a:solidFill>
+                  <a:schemeClr val="lt1"/>
+                </a:solidFill>
+                <a:latin typeface="+mn-lt"/>
+                <a:ea typeface="+mn-ea"/>
+                <a:cs typeface="+mn-cs"/>
+              </a:defRPr>
+            </a:lvl4pPr>
+            <a:lvl5pPr marL="1828800" algn="l" defTabSz="914400" rtl="0" eaLnBrk="1" latinLnBrk="0" hangingPunct="1">
+              <a:defRPr sz="1800" kern="1200">
+                <a:solidFill>
+                  <a:schemeClr val="lt1"/>
+                </a:solidFill>
+                <a:latin typeface="+mn-lt"/>
+                <a:ea typeface="+mn-ea"/>
+                <a:cs typeface="+mn-cs"/>
+              </a:defRPr>
+            </a:lvl5pPr>
+            <a:lvl6pPr marL="2286000" algn="l" defTabSz="914400" rtl="0" eaLnBrk="1" latinLnBrk="0" hangingPunct="1">
+              <a:defRPr sz="1800" kern="1200">
+                <a:solidFill>
+                  <a:schemeClr val="lt1"/>
+                </a:solidFill>
+                <a:latin typeface="+mn-lt"/>
+                <a:ea typeface="+mn-ea"/>
+                <a:cs typeface="+mn-cs"/>
+              </a:defRPr>
+            </a:lvl6pPr>
+            <a:lvl7pPr marL="2743200" algn="l" defTabSz="914400" rtl="0" eaLnBrk="1" latinLnBrk="0" hangingPunct="1">
+              <a:defRPr sz="1800" kern="1200">
+                <a:solidFill>
+                  <a:schemeClr val="lt1"/>
+                </a:solidFill>
+                <a:latin typeface="+mn-lt"/>
+                <a:ea typeface="+mn-ea"/>
+                <a:cs typeface="+mn-cs"/>
+              </a:defRPr>
+            </a:lvl7pPr>
+            <a:lvl8pPr marL="3200400" algn="l" defTabSz="914400" rtl="0" eaLnBrk="1" latinLnBrk="0" hangingPunct="1">
+              <a:defRPr sz="1800" kern="1200">
+                <a:solidFill>
+                  <a:schemeClr val="lt1"/>
+                </a:solidFill>
+                <a:latin typeface="+mn-lt"/>
+                <a:ea typeface="+mn-ea"/>
+                <a:cs typeface="+mn-cs"/>
+              </a:defRPr>
+            </a:lvl8pPr>
+            <a:lvl9pPr marL="3657600" algn="l" defTabSz="914400" rtl="0" eaLnBrk="1" latinLnBrk="0" hangingPunct="1">
+              <a:defRPr sz="1800" kern="1200">
+                <a:solidFill>
+                  <a:schemeClr val="lt1"/>
+                </a:solidFill>
+                <a:latin typeface="+mn-lt"/>
+                <a:ea typeface="+mn-ea"/>
+                <a:cs typeface="+mn-cs"/>
+              </a:defRPr>
+            </a:lvl9pPr>
+          </a:lstStyle>
+          <a:p>
+            <a:pPr algn="ctr"/>
+            <a:endParaRPr lang="pt-PT"/>
+          </a:p>
+        </p:txBody>
+      </p:sp>
+      <p:pic>
+        <p:nvPicPr>
+          <p:cNvPr id="7" name="Imagem 6" descr="Portal do Colaborador">
+            <a:extLst>
+              <a:ext uri="{FF2B5EF4-FFF2-40B4-BE49-F238E27FC236}">
+                <a16:creationId xmlns:a16="http://schemas.microsoft.com/office/drawing/2014/main" id="{A59B6DA3-4BA1-94F4-4AA2-59A6261305AE}"/>
+              </a:ext>
+            </a:extLst>
+          </p:cNvPr>
+          <p:cNvPicPr>
+            <a:picLocks noChangeAspect="1"/>
+          </p:cNvPicPr>
+          <p:nvPr/>
+        </p:nvPicPr>
+        <p:blipFill>
+          <a:blip r:embed="rId2"/>
+          <a:stretch>
+            <a:fillRect/>
+          </a:stretch>
+        </p:blipFill>
+        <p:spPr>
+          <a:xfrm>
+            <a:off x="10199775" y="117119"/>
+            <a:ext cx="1877314" cy="869240"/>
+          </a:xfrm>
+          <a:prstGeom prst="rect">
+            <a:avLst/>
+          </a:prstGeom>
+        </p:spPr>
+      </p:pic>
+      <p:sp>
+        <p:nvSpPr>
+          <p:cNvPr id="5" name="CaixaDeTexto 4">
+            <a:extLst>
+              <a:ext uri="{FF2B5EF4-FFF2-40B4-BE49-F238E27FC236}">
+                <a16:creationId xmlns:a16="http://schemas.microsoft.com/office/drawing/2014/main" id="{57F2B5C7-69A2-D265-A0CC-A46D2F230199}"/>
+              </a:ext>
+            </a:extLst>
+          </p:cNvPr>
+          <p:cNvSpPr txBox="1"/>
+          <p:nvPr/>
+        </p:nvSpPr>
+        <p:spPr>
+          <a:xfrm>
+            <a:off x="60594" y="6624809"/>
+            <a:ext cx="6801079" cy="230832"/>
+          </a:xfrm>
+          <a:prstGeom prst="rect">
+            <a:avLst/>
+          </a:prstGeom>
+          <a:noFill/>
+        </p:spPr>
+        <p:txBody>
+          <a:bodyPr rot="0" spcFirstLastPara="0" vertOverflow="overflow" horzOverflow="overflow" vert="horz" wrap="square" lIns="91440" tIns="45720" rIns="91440" bIns="45720" numCol="1" spcCol="0" rtlCol="0" fromWordArt="0" anchor="t" anchorCtr="0" forceAA="0" compatLnSpc="1">
+            <a:prstTxWarp prst="textNoShape">
+              <a:avLst/>
+            </a:prstTxWarp>
+            <a:spAutoFit/>
+          </a:bodyPr>
+          <a:lstStyle/>
+          <a:p>
+            <a:r>
+              <a:rPr lang="pt-PT" sz="900" dirty="0" err="1">
+                <a:solidFill>
+                  <a:srgbClr val="FFFFFF"/>
+                </a:solidFill>
+                <a:ea typeface="+mn-lt"/>
+                <a:cs typeface="+mn-lt"/>
+              </a:rPr>
+              <a:t>Unsupervised</a:t>
+            </a:r>
+            <a:r>
+              <a:rPr lang="pt-PT" sz="900" dirty="0">
+                <a:solidFill>
+                  <a:srgbClr val="FFFFFF"/>
+                </a:solidFill>
+                <a:ea typeface="+mn-lt"/>
+                <a:cs typeface="+mn-lt"/>
+              </a:rPr>
+              <a:t> </a:t>
+            </a:r>
+            <a:r>
+              <a:rPr lang="pt-PT" sz="900" dirty="0" err="1">
+                <a:solidFill>
+                  <a:srgbClr val="FFFFFF"/>
+                </a:solidFill>
+                <a:ea typeface="+mn-lt"/>
+                <a:cs typeface="+mn-lt"/>
+              </a:rPr>
+              <a:t>Learning</a:t>
+            </a:r>
+            <a:r>
+              <a:rPr lang="pt-PT" sz="900" dirty="0">
+                <a:solidFill>
+                  <a:srgbClr val="FFFFFF"/>
+                </a:solidFill>
+                <a:ea typeface="+mn-lt"/>
+                <a:cs typeface="+mn-lt"/>
+              </a:rPr>
+              <a:t> - </a:t>
+            </a:r>
+            <a:r>
+              <a:rPr lang="pt-PT" sz="900" dirty="0" err="1">
+                <a:solidFill>
+                  <a:srgbClr val="FFFFFF"/>
+                </a:solidFill>
+                <a:ea typeface="+mn-lt"/>
+                <a:cs typeface="+mn-lt"/>
+              </a:rPr>
+              <a:t>Clustering</a:t>
+            </a:r>
+            <a:endParaRPr lang="pt-PT" dirty="0" err="1"/>
+          </a:p>
+        </p:txBody>
+      </p:sp>
+      <p:sp>
+        <p:nvSpPr>
+          <p:cNvPr id="6" name="CaixaDeTexto 5">
+            <a:extLst>
+              <a:ext uri="{FF2B5EF4-FFF2-40B4-BE49-F238E27FC236}">
+                <a16:creationId xmlns:a16="http://schemas.microsoft.com/office/drawing/2014/main" id="{AE4BAC88-6A2B-E578-4ABE-EF35CB42086C}"/>
+              </a:ext>
+            </a:extLst>
+          </p:cNvPr>
+          <p:cNvSpPr txBox="1"/>
+          <p:nvPr/>
+        </p:nvSpPr>
+        <p:spPr>
+          <a:xfrm>
+            <a:off x="5275244" y="6624808"/>
+            <a:ext cx="6801079" cy="230832"/>
+          </a:xfrm>
+          <a:prstGeom prst="rect">
+            <a:avLst/>
+          </a:prstGeom>
+          <a:noFill/>
+        </p:spPr>
+        <p:txBody>
+          <a:bodyPr rot="0" spcFirstLastPara="0" vertOverflow="overflow" horzOverflow="overflow" vert="horz" wrap="square" lIns="91440" tIns="45720" rIns="91440" bIns="45720" numCol="1" spcCol="0" rtlCol="0" fromWordArt="0" anchor="t" anchorCtr="0" forceAA="0" compatLnSpc="1">
+            <a:prstTxWarp prst="textNoShape">
+              <a:avLst/>
+            </a:prstTxWarp>
+            <a:spAutoFit/>
+          </a:bodyPr>
+          <a:lstStyle/>
+          <a:p>
+            <a:pPr algn="r"/>
+            <a:r>
+              <a:rPr lang="pt-PT" sz="900" dirty="0" err="1">
+                <a:solidFill>
+                  <a:srgbClr val="FFFFFF"/>
+                </a:solidFill>
+                <a:latin typeface="Times New Roman"/>
+                <a:cs typeface="Times New Roman"/>
+              </a:rPr>
+              <a:t>Session</a:t>
+            </a:r>
+            <a:r>
+              <a:rPr lang="pt-PT" sz="900" dirty="0">
+                <a:solidFill>
+                  <a:srgbClr val="FFFFFF"/>
+                </a:solidFill>
+                <a:latin typeface="Times New Roman"/>
+                <a:cs typeface="Times New Roman"/>
+              </a:rPr>
+              <a:t> 5</a:t>
+            </a:r>
+            <a:endParaRPr lang="pt-PT" dirty="0"/>
+          </a:p>
+        </p:txBody>
+      </p:sp>
+    </p:spTree>
+    <p:extLst>
+      <p:ext uri="{BB962C8B-B14F-4D97-AF65-F5344CB8AC3E}">
+        <p14:creationId xmlns:p14="http://schemas.microsoft.com/office/powerpoint/2010/main" val="119666502"/>
+      </p:ext>
+    </p:extLst>
+  </p:cSld>
+  <p:clrMapOvr>
+    <a:masterClrMapping/>
+  </p:clrMapOvr>
+</p:sld>
+</file>
+
 <file path=ppt/theme/theme1.xml><?xml version="1.0" encoding="utf-8"?>
 <a:theme xmlns:a="http://schemas.openxmlformats.org/drawingml/2006/main" name="Tema do Office">
   <a:themeElements>

</xml_diff>